<commit_message>
Slides 10 & 11
</commit_message>
<xml_diff>
--- a/slides-steve/Chapter 10.pptx
+++ b/slides-steve/Chapter 10.pptx
@@ -150,6 +150,22 @@
       </a:defRPr>
     </a:lvl9pPr>
   </p:defaultTextStyle>
+  <p:extLst>
+    <p:ext uri="{EFAFB233-063F-42B5-8137-9DF3F51BA10A}">
+      <p15:sldGuideLst xmlns:p15="http://schemas.microsoft.com/office/powerpoint/2012/main">
+        <p15:guide id="1" orient="horz" pos="2160">
+          <p15:clr>
+            <a:srgbClr val="A4A3A4"/>
+          </p15:clr>
+        </p15:guide>
+        <p15:guide id="2" pos="2880">
+          <p15:clr>
+            <a:srgbClr val="A4A3A4"/>
+          </p15:clr>
+        </p15:guide>
+      </p15:sldGuideLst>
+    </p:ext>
+  </p:extLst>
 </p:presentation>
 </file>
 
@@ -235,7 +251,7 @@
           <a:p>
             <a:fld id="{7688146B-ADFA-DF44-B228-378083D573DA}" type="datetimeFigureOut">
               <a:rPr lang="en-US" smtClean="0"/>
-              <a:t>9/29/15</a:t>
+              <a:t>9/29/16</a:t>
             </a:fld>
             <a:endParaRPr lang="en-US"/>
           </a:p>
@@ -401,7 +417,7 @@
           <a:p>
             <a:fld id="{A585CD01-E5F8-B947-BA8D-4D5016F18998}" type="datetimeFigureOut">
               <a:rPr lang="en-US" smtClean="0"/>
-              <a:t>9/29/15</a:t>
+              <a:t>9/29/16</a:t>
             </a:fld>
             <a:endParaRPr lang="en-US"/>
           </a:p>
@@ -1145,7 +1161,7 @@
           <a:p>
             <a:fld id="{58A8A48C-9099-6048-AFC9-2EAF71CC6203}" type="datetime1">
               <a:rPr lang="en-US" smtClean="0"/>
-              <a:t>9/29/15</a:t>
+              <a:t>9/29/16</a:t>
             </a:fld>
             <a:endParaRPr lang="en-US"/>
           </a:p>
@@ -1437,7 +1453,7 @@
           <a:p>
             <a:fld id="{B4658972-F629-F242-BDCA-9DD655A2CAEC}" type="datetime1">
               <a:rPr lang="en-US" smtClean="0"/>
-              <a:t>9/29/15</a:t>
+              <a:t>9/29/16</a:t>
             </a:fld>
             <a:endParaRPr lang="en-US"/>
           </a:p>
@@ -1559,7 +1575,7 @@
           <a:p>
             <a:fld id="{6C68007B-A47A-FA4B-983E-397D28951014}" type="datetime1">
               <a:rPr lang="en-US" smtClean="0"/>
-              <a:t>9/29/15</a:t>
+              <a:t>9/29/16</a:t>
             </a:fld>
             <a:endParaRPr lang="en-US"/>
           </a:p>
@@ -1658,7 +1674,7 @@
           <a:p>
             <a:fld id="{D043FE4A-95DC-1740-91D2-6FC17EB88726}" type="datetime1">
               <a:rPr lang="en-US" smtClean="0"/>
-              <a:t>9/29/15</a:t>
+              <a:t>9/29/16</a:t>
             </a:fld>
             <a:endParaRPr lang="en-US"/>
           </a:p>
@@ -1904,7 +1920,7 @@
           <a:p>
             <a:fld id="{05772B59-63F5-D046-BB7D-F8CED31D54E9}" type="datetime1">
               <a:rPr lang="en-US" smtClean="0"/>
-              <a:t>9/29/15</a:t>
+              <a:t>9/29/16</a:t>
             </a:fld>
             <a:endParaRPr lang="en-US"/>
           </a:p>
@@ -2150,7 +2166,7 @@
           <a:p>
             <a:fld id="{7AD8B603-99DE-3240-84DA-46E59B0DDB61}" type="datetime1">
               <a:rPr lang="en-US" smtClean="0"/>
-              <a:t>9/29/15</a:t>
+              <a:t>9/29/16</a:t>
             </a:fld>
             <a:endParaRPr lang="en-US"/>
           </a:p>
@@ -2542,7 +2558,11 @@
           <a:p>
             <a:r>
               <a:rPr lang="en-US" dirty="0" smtClean="0"/>
-              <a:t>Chapter Ten</a:t>
+              <a:t>Chapter </a:t>
+            </a:r>
+            <a:r>
+              <a:rPr lang="en-US" dirty="0" smtClean="0"/>
+              <a:t>10</a:t>
             </a:r>
             <a:endParaRPr lang="en-US" dirty="0"/>
           </a:p>
@@ -2586,7 +2606,7 @@
   <p:timing>
     <p:tnLst>
       <p:par>
-        <p:cTn xmlns:p14="http://schemas.microsoft.com/office/powerpoint/2010/main" id="1" dur="indefinite" restart="never" nodeType="tmRoot"/>
+        <p:cTn id="1" dur="indefinite" restart="never" nodeType="tmRoot"/>
       </p:par>
     </p:tnLst>
   </p:timing>
@@ -2703,7 +2723,7 @@
           <a:p>
             <a:fld id="{58A8A48C-9099-6048-AFC9-2EAF71CC6203}" type="datetime1">
               <a:rPr lang="en-US" smtClean="0"/>
-              <a:t>9/29/15</a:t>
+              <a:t>9/29/16</a:t>
             </a:fld>
             <a:endParaRPr lang="en-US"/>
           </a:p>
@@ -2768,7 +2788,7 @@
   <p:timing>
     <p:tnLst>
       <p:par>
-        <p:cTn xmlns:p14="http://schemas.microsoft.com/office/powerpoint/2010/main" id="1" dur="indefinite" restart="never" nodeType="tmRoot"/>
+        <p:cTn id="1" dur="indefinite" restart="never" nodeType="tmRoot"/>
       </p:par>
     </p:tnLst>
   </p:timing>
@@ -2869,7 +2889,7 @@
           <a:p>
             <a:fld id="{58A8A48C-9099-6048-AFC9-2EAF71CC6203}" type="datetime1">
               <a:rPr lang="en-US" smtClean="0"/>
-              <a:t>9/29/15</a:t>
+              <a:t>9/29/16</a:t>
             </a:fld>
             <a:endParaRPr lang="en-US"/>
           </a:p>
@@ -3056,7 +3076,7 @@
           <a:p>
             <a:fld id="{58A8A48C-9099-6048-AFC9-2EAF71CC6203}" type="datetime1">
               <a:rPr lang="en-US" smtClean="0"/>
-              <a:t>9/29/15</a:t>
+              <a:t>9/29/16</a:t>
             </a:fld>
             <a:endParaRPr lang="en-US"/>
           </a:p>
@@ -3206,7 +3226,11 @@
             <a:pPr lvl="1"/>
             <a:r>
               <a:rPr lang="en-US" dirty="0" smtClean="0"/>
-              <a:t>Different services reached via different port numbers</a:t>
+              <a:t>Different services reached via different </a:t>
+            </a:r>
+            <a:r>
+              <a:rPr lang="en-US" i="1" dirty="0" smtClean="0"/>
+              <a:t>port numbers</a:t>
             </a:r>
           </a:p>
           <a:p>
@@ -3243,7 +3267,7 @@
           <a:p>
             <a:fld id="{58A8A48C-9099-6048-AFC9-2EAF71CC6203}" type="datetime1">
               <a:rPr lang="en-US" smtClean="0"/>
-              <a:t>9/29/15</a:t>
+              <a:t>9/29/16</a:t>
             </a:fld>
             <a:endParaRPr lang="en-US"/>
           </a:p>
@@ -3383,7 +3407,11 @@
           <a:p>
             <a:r>
               <a:rPr lang="en-US" dirty="0" smtClean="0"/>
-              <a:t>25 SMTP</a:t>
+              <a:t>25: </a:t>
+            </a:r>
+            <a:r>
+              <a:rPr lang="en-US" dirty="0" smtClean="0"/>
+              <a:t>SMTP</a:t>
             </a:r>
           </a:p>
           <a:p>
@@ -3400,25 +3428,36 @@
           </a:p>
           <a:p>
             <a:r>
-              <a:rPr lang="en-US" dirty="0"/>
+              <a:rPr lang="en-US" dirty="0">
+                <a:hlinkClick r:id="rId2"/>
+              </a:rPr>
               <a:t>https://</a:t>
             </a:r>
             <a:r>
-              <a:rPr lang="en-US" dirty="0" err="1"/>
+              <a:rPr lang="en-US" dirty="0" err="1">
+                <a:hlinkClick r:id="rId2"/>
+              </a:rPr>
               <a:t>www.ietf.org</a:t>
             </a:r>
             <a:r>
-              <a:rPr lang="en-US" dirty="0"/>
+              <a:rPr lang="en-US" dirty="0">
+                <a:hlinkClick r:id="rId2"/>
+              </a:rPr>
               <a:t>/</a:t>
             </a:r>
             <a:r>
-              <a:rPr lang="en-US" dirty="0" err="1"/>
+              <a:rPr lang="en-US" dirty="0" err="1">
+                <a:hlinkClick r:id="rId2"/>
+              </a:rPr>
               <a:t>rfc</a:t>
             </a:r>
             <a:r>
-              <a:rPr lang="en-US" dirty="0"/>
+              <a:rPr lang="en-US" dirty="0">
+                <a:hlinkClick r:id="rId2"/>
+              </a:rPr>
               <a:t>/rfc1700.txt</a:t>
             </a:r>
+            <a:endParaRPr lang="en-US" dirty="0"/>
           </a:p>
         </p:txBody>
       </p:sp>
@@ -3439,7 +3478,7 @@
           <a:p>
             <a:fld id="{58A8A48C-9099-6048-AFC9-2EAF71CC6203}" type="datetime1">
               <a:rPr lang="en-US" smtClean="0"/>
-              <a:t>9/29/15</a:t>
+              <a:t>9/29/16</a:t>
             </a:fld>
             <a:endParaRPr lang="en-US"/>
           </a:p>
@@ -3567,7 +3606,15 @@
           <a:p>
             <a:r>
               <a:rPr lang="en-US" dirty="0" smtClean="0"/>
-              <a:t>Client connects to well-known port</a:t>
+              <a:t>Client connects to </a:t>
+            </a:r>
+            <a:r>
+              <a:rPr lang="en-US" dirty="0" smtClean="0"/>
+              <a:t>a well-known </a:t>
+            </a:r>
+            <a:r>
+              <a:rPr lang="en-US" dirty="0" smtClean="0"/>
+              <a:t>port</a:t>
             </a:r>
           </a:p>
           <a:p>
@@ -3603,7 +3650,7 @@
           <a:p>
             <a:fld id="{58A8A48C-9099-6048-AFC9-2EAF71CC6203}" type="datetime1">
               <a:rPr lang="en-US" smtClean="0"/>
-              <a:t>9/29/15</a:t>
+              <a:t>9/29/16</a:t>
             </a:fld>
             <a:endParaRPr lang="en-US"/>
           </a:p>
@@ -3725,15 +3772,13 @@
           <a:p>
             <a:r>
               <a:rPr lang="en-US" dirty="0" smtClean="0"/>
-              <a:t>Internet Corporation for Assigned Names and Numbers</a:t>
-            </a:r>
-          </a:p>
-          <a:p>
-            <a:pPr lvl="1"/>
-            <a:r>
-              <a:rPr lang="en-US" dirty="0" smtClean="0"/>
-              <a:t>ICANN</a:t>
-            </a:r>
+              <a:t>Internet Corporation for Assigned Names and </a:t>
+            </a:r>
+            <a:r>
+              <a:rPr lang="en-US" dirty="0" smtClean="0"/>
+              <a:t>Numbers (ICANN)</a:t>
+            </a:r>
+            <a:endParaRPr lang="en-US" dirty="0" smtClean="0"/>
           </a:p>
         </p:txBody>
       </p:sp>
@@ -3754,7 +3799,7 @@
           <a:p>
             <a:fld id="{58A8A48C-9099-6048-AFC9-2EAF71CC6203}" type="datetime1">
               <a:rPr lang="en-US" smtClean="0"/>
-              <a:t>9/29/15</a:t>
+              <a:t>9/29/16</a:t>
             </a:fld>
             <a:endParaRPr lang="en-US"/>
           </a:p>
@@ -3904,7 +3949,7 @@
           <a:p>
             <a:fld id="{58A8A48C-9099-6048-AFC9-2EAF71CC6203}" type="datetime1">
               <a:rPr lang="en-US" smtClean="0"/>
-              <a:t>9/29/15</a:t>
+              <a:t>9/29/16</a:t>
             </a:fld>
             <a:endParaRPr lang="en-US"/>
           </a:p>
@@ -4062,7 +4107,7 @@
           <a:p>
             <a:fld id="{58A8A48C-9099-6048-AFC9-2EAF71CC6203}" type="datetime1">
               <a:rPr lang="en-US" smtClean="0"/>
-              <a:t>9/29/15</a:t>
+              <a:t>9/29/16</a:t>
             </a:fld>
             <a:endParaRPr lang="en-US"/>
           </a:p>
@@ -4255,7 +4300,7 @@
           <a:p>
             <a:fld id="{58A8A48C-9099-6048-AFC9-2EAF71CC6203}" type="datetime1">
               <a:rPr lang="en-US" smtClean="0"/>
-              <a:t>9/29/15</a:t>
+              <a:t>9/29/16</a:t>
             </a:fld>
             <a:endParaRPr lang="en-US"/>
           </a:p>
@@ -4448,7 +4493,7 @@
           <a:p>
             <a:fld id="{85CE5E67-554E-4845-A9FC-0C83FC55F8C1}" type="datetime1">
               <a:rPr lang="en-US" smtClean="0"/>
-              <a:t>9/29/15</a:t>
+              <a:t>9/29/16</a:t>
             </a:fld>
             <a:endParaRPr lang="en-US"/>
           </a:p>
@@ -4513,7 +4558,7 @@
   <p:timing>
     <p:tnLst>
       <p:par>
-        <p:cTn xmlns:p14="http://schemas.microsoft.com/office/powerpoint/2010/main" id="1" dur="indefinite" restart="never" nodeType="tmRoot"/>
+        <p:cTn id="1" dur="indefinite" restart="never" nodeType="tmRoot"/>
       </p:par>
     </p:tnLst>
   </p:timing>
@@ -4638,7 +4683,7 @@
           <a:p>
             <a:fld id="{58A8A48C-9099-6048-AFC9-2EAF71CC6203}" type="datetime1">
               <a:rPr lang="en-US" smtClean="0"/>
-              <a:t>9/29/15</a:t>
+              <a:t>9/29/16</a:t>
             </a:fld>
             <a:endParaRPr lang="en-US"/>
           </a:p>
@@ -4802,7 +4847,7 @@
           <a:p>
             <a:fld id="{58A8A48C-9099-6048-AFC9-2EAF71CC6203}" type="datetime1">
               <a:rPr lang="en-US" smtClean="0"/>
-              <a:t>9/29/15</a:t>
+              <a:t>9/29/16</a:t>
             </a:fld>
             <a:endParaRPr lang="en-US"/>
           </a:p>
@@ -4979,7 +5024,7 @@
           <a:p>
             <a:fld id="{58A8A48C-9099-6048-AFC9-2EAF71CC6203}" type="datetime1">
               <a:rPr lang="en-US" smtClean="0"/>
-              <a:t>9/29/15</a:t>
+              <a:t>9/29/16</a:t>
             </a:fld>
             <a:endParaRPr lang="en-US"/>
           </a:p>
@@ -5165,7 +5210,7 @@
           <a:p>
             <a:fld id="{58A8A48C-9099-6048-AFC9-2EAF71CC6203}" type="datetime1">
               <a:rPr lang="en-US" smtClean="0"/>
-              <a:t>9/29/15</a:t>
+              <a:t>9/29/16</a:t>
             </a:fld>
             <a:endParaRPr lang="en-US"/>
           </a:p>
@@ -5294,7 +5339,11 @@
             <a:pPr lvl="1"/>
             <a:r>
               <a:rPr lang="en-US" dirty="0" smtClean="0"/>
-              <a:t>Check pointing, rollback, etc.</a:t>
+              <a:t>Check-pointing</a:t>
+            </a:r>
+            <a:r>
+              <a:rPr lang="en-US" dirty="0" smtClean="0"/>
+              <a:t>, rollback, etc.</a:t>
             </a:r>
           </a:p>
           <a:p>
@@ -5359,7 +5408,7 @@
           <a:p>
             <a:fld id="{58A8A48C-9099-6048-AFC9-2EAF71CC6203}" type="datetime1">
               <a:rPr lang="en-US" smtClean="0"/>
-              <a:t>9/29/15</a:t>
+              <a:t>9/29/16</a:t>
             </a:fld>
             <a:endParaRPr lang="en-US"/>
           </a:p>
@@ -5547,7 +5596,7 @@
           <a:p>
             <a:fld id="{58A8A48C-9099-6048-AFC9-2EAF71CC6203}" type="datetime1">
               <a:rPr lang="en-US" smtClean="0"/>
-              <a:t>9/29/15</a:t>
+              <a:t>9/29/16</a:t>
             </a:fld>
             <a:endParaRPr lang="en-US"/>
           </a:p>
@@ -5694,7 +5743,7 @@
           <a:p>
             <a:fld id="{58A8A48C-9099-6048-AFC9-2EAF71CC6203}" type="datetime1">
               <a:rPr lang="en-US" smtClean="0"/>
-              <a:t>9/29/15</a:t>
+              <a:t>9/29/16</a:t>
             </a:fld>
             <a:endParaRPr lang="en-US"/>
           </a:p>
@@ -5845,7 +5894,7 @@
           <a:p>
             <a:fld id="{58A8A48C-9099-6048-AFC9-2EAF71CC6203}" type="datetime1">
               <a:rPr lang="en-US" smtClean="0"/>
-              <a:t>9/29/15</a:t>
+              <a:t>9/29/16</a:t>
             </a:fld>
             <a:endParaRPr lang="en-US"/>
           </a:p>
@@ -6017,7 +6066,7 @@
           <a:p>
             <a:fld id="{58A8A48C-9099-6048-AFC9-2EAF71CC6203}" type="datetime1">
               <a:rPr lang="en-US" smtClean="0"/>
-              <a:t>9/29/15</a:t>
+              <a:t>9/29/16</a:t>
             </a:fld>
             <a:endParaRPr lang="en-US"/>
           </a:p>
@@ -6194,7 +6243,7 @@
           <a:p>
             <a:fld id="{58A8A48C-9099-6048-AFC9-2EAF71CC6203}" type="datetime1">
               <a:rPr lang="en-US" smtClean="0"/>
-              <a:t>9/29/15</a:t>
+              <a:t>9/29/16</a:t>
             </a:fld>
             <a:endParaRPr lang="en-US"/>
           </a:p>
@@ -6380,7 +6429,7 @@
           <a:p>
             <a:fld id="{58A8A48C-9099-6048-AFC9-2EAF71CC6203}" type="datetime1">
               <a:rPr lang="en-US" smtClean="0"/>
-              <a:t>9/29/15</a:t>
+              <a:t>9/29/16</a:t>
             </a:fld>
             <a:endParaRPr lang="en-US"/>
           </a:p>
@@ -6445,7 +6494,7 @@
   <p:timing>
     <p:tnLst>
       <p:par>
-        <p:cTn xmlns:p14="http://schemas.microsoft.com/office/powerpoint/2010/main" id="1" dur="indefinite" restart="never" nodeType="tmRoot"/>
+        <p:cTn id="1" dur="indefinite" restart="never" nodeType="tmRoot"/>
       </p:par>
     </p:tnLst>
   </p:timing>
@@ -6534,7 +6583,7 @@
           <a:p>
             <a:fld id="{58A8A48C-9099-6048-AFC9-2EAF71CC6203}" type="datetime1">
               <a:rPr lang="en-US" smtClean="0"/>
-              <a:t>9/29/15</a:t>
+              <a:t>9/29/16</a:t>
             </a:fld>
             <a:endParaRPr lang="en-US"/>
           </a:p>
@@ -6714,7 +6763,7 @@
           <a:p>
             <a:fld id="{58A8A48C-9099-6048-AFC9-2EAF71CC6203}" type="datetime1">
               <a:rPr lang="en-US" smtClean="0"/>
-              <a:t>9/29/15</a:t>
+              <a:t>9/29/16</a:t>
             </a:fld>
             <a:endParaRPr lang="en-US"/>
           </a:p>
@@ -6898,7 +6947,7 @@
           <a:p>
             <a:fld id="{58A8A48C-9099-6048-AFC9-2EAF71CC6203}" type="datetime1">
               <a:rPr lang="en-US" smtClean="0"/>
-              <a:t>9/29/15</a:t>
+              <a:t>9/29/16</a:t>
             </a:fld>
             <a:endParaRPr lang="en-US"/>
           </a:p>
@@ -7063,8 +7112,13 @@
             <a:pPr lvl="1"/>
             <a:r>
               <a:rPr lang="en-US" dirty="0" smtClean="0"/>
-              <a:t>Automatic scaling</a:t>
-            </a:r>
+              <a:t>Automatic </a:t>
+            </a:r>
+            <a:r>
+              <a:rPr lang="en-US" dirty="0" smtClean="0"/>
+              <a:t>scaling (elasticity)</a:t>
+            </a:r>
+            <a:endParaRPr lang="en-US" dirty="0" smtClean="0"/>
           </a:p>
           <a:p>
             <a:r>
@@ -7118,7 +7172,7 @@
           <a:p>
             <a:fld id="{58A8A48C-9099-6048-AFC9-2EAF71CC6203}" type="datetime1">
               <a:rPr lang="en-US" smtClean="0"/>
-              <a:t>9/29/15</a:t>
+              <a:t>9/29/16</a:t>
             </a:fld>
             <a:endParaRPr lang="en-US"/>
           </a:p>
@@ -7265,7 +7319,7 @@
           <a:p>
             <a:fld id="{58A8A48C-9099-6048-AFC9-2EAF71CC6203}" type="datetime1">
               <a:rPr lang="en-US" smtClean="0"/>
-              <a:t>9/29/15</a:t>
+              <a:t>9/29/16</a:t>
             </a:fld>
             <a:endParaRPr lang="en-US"/>
           </a:p>
@@ -7457,7 +7511,7 @@
           <a:p>
             <a:fld id="{58A8A48C-9099-6048-AFC9-2EAF71CC6203}" type="datetime1">
               <a:rPr lang="en-US" smtClean="0"/>
-              <a:t>9/29/15</a:t>
+              <a:t>9/29/16</a:t>
             </a:fld>
             <a:endParaRPr lang="en-US"/>
           </a:p>
@@ -7604,7 +7658,7 @@
           <a:p>
             <a:fld id="{58A8A48C-9099-6048-AFC9-2EAF71CC6203}" type="datetime1">
               <a:rPr lang="en-US" smtClean="0"/>
-              <a:t>9/29/15</a:t>
+              <a:t>9/29/16</a:t>
             </a:fld>
             <a:endParaRPr lang="en-US"/>
           </a:p>
@@ -7703,7 +7757,7 @@
           <a:p>
             <a:r>
               <a:rPr lang="en-US" dirty="0" smtClean="0"/>
-              <a:t>Peer to Peer</a:t>
+              <a:t>Peer to Peer (P2P)</a:t>
             </a:r>
             <a:endParaRPr lang="en-US" dirty="0"/>
           </a:p>
@@ -7784,7 +7838,7 @@
           <a:p>
             <a:fld id="{58A8A48C-9099-6048-AFC9-2EAF71CC6203}" type="datetime1">
               <a:rPr lang="en-US" smtClean="0"/>
-              <a:t>9/29/15</a:t>
+              <a:t>9/29/16</a:t>
             </a:fld>
             <a:endParaRPr lang="en-US"/>
           </a:p>
@@ -7940,7 +7994,11 @@
             <a:pPr lvl="1"/>
             <a:r>
               <a:rPr lang="en-US" dirty="0" smtClean="0"/>
-              <a:t>Song weren’t supposed to be stored centrally</a:t>
+              <a:t>Songs </a:t>
+            </a:r>
+            <a:r>
+              <a:rPr lang="en-US" dirty="0" smtClean="0"/>
+              <a:t>weren’t supposed to be stored centrally</a:t>
             </a:r>
             <a:endParaRPr lang="en-US" dirty="0"/>
           </a:p>
@@ -7963,7 +8021,7 @@
           <a:p>
             <a:fld id="{58A8A48C-9099-6048-AFC9-2EAF71CC6203}" type="datetime1">
               <a:rPr lang="en-US" smtClean="0"/>
-              <a:t>9/29/15</a:t>
+              <a:t>9/29/16</a:t>
             </a:fld>
             <a:endParaRPr lang="en-US"/>
           </a:p>
@@ -8154,7 +8212,7 @@
           <a:p>
             <a:fld id="{58A8A48C-9099-6048-AFC9-2EAF71CC6203}" type="datetime1">
               <a:rPr lang="en-US" smtClean="0"/>
-              <a:t>9/29/15</a:t>
+              <a:t>9/29/16</a:t>
             </a:fld>
             <a:endParaRPr lang="en-US"/>
           </a:p>
@@ -8301,7 +8359,7 @@
           <a:p>
             <a:fld id="{58A8A48C-9099-6048-AFC9-2EAF71CC6203}" type="datetime1">
               <a:rPr lang="en-US" smtClean="0"/>
-              <a:t>9/29/15</a:t>
+              <a:t>9/29/16</a:t>
             </a:fld>
             <a:endParaRPr lang="en-US"/>
           </a:p>
@@ -8366,7 +8424,7 @@
   <p:timing>
     <p:tnLst>
       <p:par>
-        <p:cTn xmlns:p14="http://schemas.microsoft.com/office/powerpoint/2010/main" id="1" dur="indefinite" restart="never" nodeType="tmRoot"/>
+        <p:cTn id="1" dur="indefinite" restart="never" nodeType="tmRoot"/>
       </p:par>
     </p:tnLst>
   </p:timing>
@@ -8471,7 +8529,7 @@
           <a:p>
             <a:fld id="{58A8A48C-9099-6048-AFC9-2EAF71CC6203}" type="datetime1">
               <a:rPr lang="en-US" smtClean="0"/>
-              <a:t>9/29/15</a:t>
+              <a:t>9/29/16</a:t>
             </a:fld>
             <a:endParaRPr lang="en-US"/>
           </a:p>
@@ -8622,7 +8680,7 @@
           <a:p>
             <a:fld id="{58A8A48C-9099-6048-AFC9-2EAF71CC6203}" type="datetime1">
               <a:rPr lang="en-US" smtClean="0"/>
-              <a:t>9/29/15</a:t>
+              <a:t>9/29/16</a:t>
             </a:fld>
             <a:endParaRPr lang="en-US"/>
           </a:p>
@@ -8763,7 +8821,15 @@
             <a:pPr lvl="1"/>
             <a:r>
               <a:rPr lang="en-US" dirty="0" smtClean="0"/>
-              <a:t>Now readers don’t have up to date information</a:t>
+              <a:t>Now readers don’t have </a:t>
+            </a:r>
+            <a:r>
+              <a:rPr lang="en-US" dirty="0" smtClean="0"/>
+              <a:t>up-to-date </a:t>
+            </a:r>
+            <a:r>
+              <a:rPr lang="en-US" dirty="0" smtClean="0"/>
+              <a:t>information</a:t>
             </a:r>
           </a:p>
           <a:p>
@@ -8806,7 +8872,7 @@
           <a:p>
             <a:fld id="{58A8A48C-9099-6048-AFC9-2EAF71CC6203}" type="datetime1">
               <a:rPr lang="en-US" smtClean="0"/>
-              <a:t>9/29/15</a:t>
+              <a:t>9/29/16</a:t>
             </a:fld>
             <a:endParaRPr lang="en-US"/>
           </a:p>
@@ -8871,7 +8937,7 @@
   <p:timing>
     <p:tnLst>
       <p:par>
-        <p:cTn xmlns:p14="http://schemas.microsoft.com/office/powerpoint/2010/main" id="1" dur="indefinite" restart="never" nodeType="tmRoot"/>
+        <p:cTn id="1" dur="indefinite" restart="never" nodeType="tmRoot"/>
       </p:par>
     </p:tnLst>
   </p:timing>
@@ -8935,7 +9001,11 @@
           <a:p>
             <a:r>
               <a:rPr lang="en-US" dirty="0" smtClean="0"/>
-              <a:t>Write through: update when change made</a:t>
+              <a:t>Write-through</a:t>
+            </a:r>
+            <a:r>
+              <a:rPr lang="en-US" dirty="0" smtClean="0"/>
+              <a:t>: update when change made</a:t>
             </a:r>
           </a:p>
           <a:p>
@@ -8948,21 +9018,25 @@
           <a:p>
             <a:r>
               <a:rPr lang="en-US" dirty="0" smtClean="0"/>
-              <a:t>Write on</a:t>
-            </a:r>
-            <a:r>
-              <a:rPr lang="en-US" dirty="0"/>
-              <a:t> </a:t>
-            </a:r>
-            <a:r>
-              <a:rPr lang="en-US" dirty="0" smtClean="0"/>
-              <a:t>close: don’t write until application closes</a:t>
-            </a:r>
-          </a:p>
-          <a:p>
-            <a:r>
-              <a:rPr lang="en-US" dirty="0" smtClean="0"/>
-              <a:t>Delayed write: batch changes for a certain amount of time</a:t>
+              <a:t>Write-on-close</a:t>
+            </a:r>
+            <a:r>
+              <a:rPr lang="en-US" dirty="0" smtClean="0"/>
+              <a:t>: don’t write until application closes</a:t>
+            </a:r>
+          </a:p>
+          <a:p>
+            <a:r>
+              <a:rPr lang="en-US" dirty="0" smtClean="0"/>
+              <a:t>Delayed write: batch changes </a:t>
+            </a:r>
+            <a:r>
+              <a:rPr lang="en-US" dirty="0" smtClean="0"/>
+              <a:t>accumulated in a </a:t>
+            </a:r>
+            <a:r>
+              <a:rPr lang="en-US" dirty="0" smtClean="0"/>
+              <a:t>certain amount of time</a:t>
             </a:r>
             <a:endParaRPr lang="en-US" dirty="0"/>
           </a:p>
@@ -8985,7 +9059,7 @@
           <a:p>
             <a:fld id="{58A8A48C-9099-6048-AFC9-2EAF71CC6203}" type="datetime1">
               <a:rPr lang="en-US" smtClean="0"/>
-              <a:t>9/29/15</a:t>
+              <a:t>9/29/16</a:t>
             </a:fld>
             <a:endParaRPr lang="en-US"/>
           </a:p>
@@ -9050,7 +9124,7 @@
   <p:timing>
     <p:tnLst>
       <p:par>
-        <p:cTn xmlns:p14="http://schemas.microsoft.com/office/powerpoint/2010/main" id="1" dur="indefinite" restart="never" nodeType="tmRoot"/>
+        <p:cTn id="1" dur="indefinite" restart="never" nodeType="tmRoot"/>
       </p:par>
     </p:tnLst>
   </p:timing>
@@ -9114,7 +9188,11 @@
           <a:p>
             <a:r>
               <a:rPr lang="en-US" dirty="0" smtClean="0"/>
-              <a:t>Client initiated update</a:t>
+              <a:t>Client-initiated </a:t>
+            </a:r>
+            <a:r>
+              <a:rPr lang="en-US" dirty="0" smtClean="0"/>
+              <a:t>update</a:t>
             </a:r>
           </a:p>
           <a:p>
@@ -9127,8 +9205,9 @@
           <a:p>
             <a:r>
               <a:rPr lang="en-US" dirty="0" smtClean="0"/>
-              <a:t>Server initiated</a:t>
-            </a:r>
+              <a:t>Server-initiated</a:t>
+            </a:r>
+            <a:endParaRPr lang="en-US" dirty="0" smtClean="0"/>
           </a:p>
           <a:p>
             <a:pPr lvl="1"/>
@@ -9164,7 +9243,7 @@
           <a:p>
             <a:fld id="{58A8A48C-9099-6048-AFC9-2EAF71CC6203}" type="datetime1">
               <a:rPr lang="en-US" smtClean="0"/>
-              <a:t>9/29/15</a:t>
+              <a:t>9/29/16</a:t>
             </a:fld>
             <a:endParaRPr lang="en-US"/>
           </a:p>
@@ -9229,7 +9308,7 @@
   <p:timing>
     <p:tnLst>
       <p:par>
-        <p:cTn xmlns:p14="http://schemas.microsoft.com/office/powerpoint/2010/main" id="1" dur="indefinite" restart="never" nodeType="tmRoot"/>
+        <p:cTn id="1" dur="indefinite" restart="never" nodeType="tmRoot"/>
       </p:par>
     </p:tnLst>
   </p:timing>
@@ -9313,7 +9392,19 @@
             <a:pPr lvl="1"/>
             <a:r>
               <a:rPr lang="en-US" dirty="0" smtClean="0"/>
-              <a:t>On a while file so that only one person can edit</a:t>
+              <a:t>On </a:t>
+            </a:r>
+            <a:r>
+              <a:rPr lang="en-US" dirty="0" smtClean="0"/>
+              <a:t>the</a:t>
+            </a:r>
+            <a:r>
+              <a:rPr lang="en-US" dirty="0" smtClean="0"/>
+              <a:t> whole </a:t>
+            </a:r>
+            <a:r>
+              <a:rPr lang="en-US" dirty="0" smtClean="0"/>
+              <a:t>file so that only one person can edit</a:t>
             </a:r>
           </a:p>
           <a:p>
@@ -9356,7 +9447,7 @@
           <a:p>
             <a:fld id="{58A8A48C-9099-6048-AFC9-2EAF71CC6203}" type="datetime1">
               <a:rPr lang="en-US" smtClean="0"/>
-              <a:t>9/29/15</a:t>
+              <a:t>9/29/16</a:t>
             </a:fld>
             <a:endParaRPr lang="en-US"/>
           </a:p>
@@ -9421,7 +9512,7 @@
   <p:timing>
     <p:tnLst>
       <p:par>
-        <p:cTn xmlns:p14="http://schemas.microsoft.com/office/powerpoint/2010/main" id="1" dur="indefinite" restart="never" nodeType="tmRoot"/>
+        <p:cTn id="1" dur="indefinite" restart="never" nodeType="tmRoot"/>
       </p:par>
     </p:tnLst>
   </p:timing>
@@ -9522,7 +9613,7 @@
           <a:p>
             <a:fld id="{58A8A48C-9099-6048-AFC9-2EAF71CC6203}" type="datetime1">
               <a:rPr lang="en-US" smtClean="0"/>
-              <a:t>9/29/15</a:t>
+              <a:t>9/29/16</a:t>
             </a:fld>
             <a:endParaRPr lang="en-US"/>
           </a:p>
@@ -9587,7 +9678,7 @@
   <p:timing>
     <p:tnLst>
       <p:par>
-        <p:cTn xmlns:p14="http://schemas.microsoft.com/office/powerpoint/2010/main" id="1" dur="indefinite" restart="never" nodeType="tmRoot"/>
+        <p:cTn id="1" dur="indefinite" restart="never" nodeType="tmRoot"/>
       </p:par>
     </p:tnLst>
   </p:timing>

</xml_diff>